<commit_message>
added demo video, and embedded the link in the presentation
</commit_message>
<xml_diff>
--- a/Project_3-Group_3.pptx
+++ b/Project_3-Group_3.pptx
@@ -115,6 +115,11 @@
       </a:defRPr>
     </a:lvl9pPr>
   </p:defaultTextStyle>
+  <p:extLst>
+    <p:ext uri="{EFAFB233-063F-42B5-8137-9DF3F51BA10A}">
+      <p15:sldGuideLst xmlns:p15="http://schemas.microsoft.com/office/powerpoint/2012/main"/>
+    </p:ext>
+  </p:extLst>
 </p:presentation>
 </file>
 
@@ -11507,7 +11512,7 @@
             </a:ln>
             <a:extLst>
               <a:ext uri="{C572A759-6A51-4108-AA02-DFA0A04FC94B}">
-                <ma14:wrappingTextBoxFlag xmlns="" xmlns:ma14="http://schemas.microsoft.com/office/mac/drawingml/2011/main" val="1"/>
+                <ma14:wrappingTextBoxFlag xmlns:ma14="http://schemas.microsoft.com/office/mac/drawingml/2011/main" xmlns="" val="1"/>
               </a:ext>
             </a:extLst>
           </p:spPr>
@@ -11818,7 +11823,7 @@
             </a:ln>
             <a:extLst>
               <a:ext uri="{C572A759-6A51-4108-AA02-DFA0A04FC94B}">
-                <ma14:wrappingTextBoxFlag xmlns="" xmlns:ma14="http://schemas.microsoft.com/office/mac/drawingml/2011/main" val="1"/>
+                <ma14:wrappingTextBoxFlag xmlns:ma14="http://schemas.microsoft.com/office/mac/drawingml/2011/main" xmlns="" val="1"/>
               </a:ext>
             </a:extLst>
           </p:spPr>
@@ -12128,7 +12133,7 @@
             </a:ln>
             <a:extLst>
               <a:ext uri="{C572A759-6A51-4108-AA02-DFA0A04FC94B}">
-                <ma14:wrappingTextBoxFlag xmlns="" xmlns:ma14="http://schemas.microsoft.com/office/mac/drawingml/2011/main" val="1"/>
+                <ma14:wrappingTextBoxFlag xmlns:ma14="http://schemas.microsoft.com/office/mac/drawingml/2011/main" xmlns="" val="1"/>
               </a:ext>
             </a:extLst>
           </p:spPr>
@@ -32347,6 +32352,44 @@
           </a:p>
         </p:txBody>
       </p:sp>
+      <p:pic>
+        <p:nvPicPr>
+          <p:cNvPr id="32" name="Demo.mov">
+            <a:hlinkClick r:id="" action="ppaction://media"/>
+            <a:extLst>
+              <a:ext uri="{FF2B5EF4-FFF2-40B4-BE49-F238E27FC236}">
+                <a16:creationId xmlns:a16="http://schemas.microsoft.com/office/drawing/2014/main" id="{C6FB60BD-20AD-F3F1-A874-2F1EE9167921}"/>
+              </a:ext>
+            </a:extLst>
+          </p:cNvPr>
+          <p:cNvPicPr>
+            <a:picLocks noChangeAspect="1"/>
+          </p:cNvPicPr>
+          <p:nvPr>
+            <a:videoFile r:link="rId2"/>
+            <p:extLst>
+              <p:ext uri="{DAA4B4D4-6D71-4841-9C94-3DE7FCFB9230}">
+                <p14:media xmlns:p14="http://schemas.microsoft.com/office/powerpoint/2010/main" r:link="rId1"/>
+              </p:ext>
+            </p:extLst>
+          </p:nvPr>
+        </p:nvPicPr>
+        <p:blipFill>
+          <a:blip r:embed="rId4"/>
+          <a:stretch>
+            <a:fillRect/>
+          </a:stretch>
+        </p:blipFill>
+        <p:spPr>
+          <a:xfrm>
+            <a:off x="609600" y="0"/>
+            <a:ext cx="10972800" cy="6858000"/>
+          </a:xfrm>
+          <a:prstGeom prst="rect">
+            <a:avLst/>
+          </a:prstGeom>
+        </p:spPr>
+      </p:pic>
     </p:spTree>
     <p:extLst>
       <p:ext uri="{BB962C8B-B14F-4D97-AF65-F5344CB8AC3E}">
@@ -32403,6 +32446,41 @@
                       </p:childTnLst>
                     </p:cTn>
                   </p:par>
+                  <p:par>
+                    <p:cTn id="7" fill="hold">
+                      <p:stCondLst>
+                        <p:cond delay="indefinite"/>
+                      </p:stCondLst>
+                      <p:childTnLst>
+                        <p:par>
+                          <p:cTn id="8" fill="hold">
+                            <p:stCondLst>
+                              <p:cond delay="0"/>
+                            </p:stCondLst>
+                            <p:childTnLst>
+                              <p:par>
+                                <p:cTn id="9" presetID="1" presetClass="mediacall" presetSubtype="0" fill="hold" nodeType="clickEffect">
+                                  <p:stCondLst>
+                                    <p:cond delay="0"/>
+                                  </p:stCondLst>
+                                  <p:childTnLst>
+                                    <p:cmd type="call" cmd="playFrom(0.0)">
+                                      <p:cBhvr>
+                                        <p:cTn id="10" dur="127366" fill="hold"/>
+                                        <p:tgtEl>
+                                          <p:spTgt spid="32"/>
+                                        </p:tgtEl>
+                                      </p:cBhvr>
+                                    </p:cmd>
+                                  </p:childTnLst>
+                                </p:cTn>
+                              </p:par>
+                            </p:childTnLst>
+                          </p:cTn>
+                        </p:par>
+                      </p:childTnLst>
+                    </p:cTn>
+                  </p:par>
                 </p:childTnLst>
               </p:cTn>
               <p:prevCondLst>
@@ -32416,6 +32494,76 @@
                 <p:cond evt="onNext" delay="0">
                   <p:tgtEl>
                     <p:sldTgt/>
+                  </p:tgtEl>
+                </p:cond>
+              </p:nextCondLst>
+            </p:seq>
+            <p:video fullScrn="1">
+              <p:cMediaNode vol="80000" mute="1" showWhenStopped="0">
+                <p:cTn id="11" fill="hold" display="0">
+                  <p:stCondLst>
+                    <p:cond delay="indefinite"/>
+                  </p:stCondLst>
+                </p:cTn>
+                <p:tgtEl>
+                  <p:spTgt spid="32"/>
+                </p:tgtEl>
+              </p:cMediaNode>
+            </p:video>
+            <p:seq concurrent="1" nextAc="seek">
+              <p:cTn id="12" restart="whenNotActive" fill="hold" evtFilter="cancelBubble" nodeType="interactiveSeq">
+                <p:stCondLst>
+                  <p:cond evt="onClick" delay="0">
+                    <p:tgtEl>
+                      <p:spTgt spid="32"/>
+                    </p:tgtEl>
+                  </p:cond>
+                </p:stCondLst>
+                <p:endSync evt="end" delay="0">
+                  <p:rtn val="all"/>
+                </p:endSync>
+                <p:childTnLst>
+                  <p:par>
+                    <p:cTn id="13" fill="hold">
+                      <p:stCondLst>
+                        <p:cond delay="0"/>
+                      </p:stCondLst>
+                      <p:childTnLst>
+                        <p:par>
+                          <p:cTn id="14" fill="hold">
+                            <p:stCondLst>
+                              <p:cond delay="0"/>
+                            </p:stCondLst>
+                            <p:childTnLst>
+                              <p:par>
+                                <p:cTn id="15" presetID="2" presetClass="mediacall" presetSubtype="0" fill="hold" nodeType="clickEffect">
+                                  <p:stCondLst>
+                                    <p:cond delay="0"/>
+                                  </p:stCondLst>
+                                  <p:childTnLst>
+                                    <p:cmd type="call" cmd="togglePause">
+                                      <p:cBhvr>
+                                        <p:cTn id="16" dur="1" fill="hold"/>
+                                        <p:tgtEl>
+                                          <p:spTgt spid="32"/>
+                                        </p:tgtEl>
+                                      </p:cBhvr>
+                                    </p:cmd>
+                                  </p:childTnLst>
+                                </p:cTn>
+                              </p:par>
+                            </p:childTnLst>
+                          </p:cTn>
+                        </p:par>
+                      </p:childTnLst>
+                    </p:cTn>
+                  </p:par>
+                </p:childTnLst>
+              </p:cTn>
+              <p:nextCondLst>
+                <p:cond evt="onClick" delay="0">
+                  <p:tgtEl>
+                    <p:spTgt spid="32"/>
                   </p:tgtEl>
                 </p:cond>
               </p:nextCondLst>
@@ -35894,6 +36042,59 @@
                       </p:childTnLst>
                     </p:cTn>
                   </p:par>
+                  <p:par>
+                    <p:cTn id="23" fill="hold">
+                      <p:stCondLst>
+                        <p:cond delay="indefinite"/>
+                      </p:stCondLst>
+                      <p:childTnLst>
+                        <p:par>
+                          <p:cTn id="24" fill="hold">
+                            <p:stCondLst>
+                              <p:cond delay="0"/>
+                            </p:stCondLst>
+                            <p:childTnLst>
+                              <p:par>
+                                <p:cTn id="25" presetID="9" presetClass="entr" presetSubtype="0" fill="hold" grpId="0" nodeType="clickEffect">
+                                  <p:stCondLst>
+                                    <p:cond delay="0"/>
+                                  </p:stCondLst>
+                                  <p:childTnLst>
+                                    <p:set>
+                                      <p:cBhvr>
+                                        <p:cTn id="26" dur="1" fill="hold">
+                                          <p:stCondLst>
+                                            <p:cond delay="0"/>
+                                          </p:stCondLst>
+                                        </p:cTn>
+                                        <p:tgtEl>
+                                          <p:spTgt spid="41"/>
+                                        </p:tgtEl>
+                                        <p:attrNameLst>
+                                          <p:attrName>style.visibility</p:attrName>
+                                        </p:attrNameLst>
+                                      </p:cBhvr>
+                                      <p:to>
+                                        <p:strVal val="visible"/>
+                                      </p:to>
+                                    </p:set>
+                                    <p:animEffect transition="in" filter="dissolve">
+                                      <p:cBhvr>
+                                        <p:cTn id="27" dur="500"/>
+                                        <p:tgtEl>
+                                          <p:spTgt spid="41"/>
+                                        </p:tgtEl>
+                                      </p:cBhvr>
+                                    </p:animEffect>
+                                  </p:childTnLst>
+                                </p:cTn>
+                              </p:par>
+                            </p:childTnLst>
+                          </p:cTn>
+                        </p:par>
+                      </p:childTnLst>
+                    </p:cTn>
+                  </p:par>
                 </p:childTnLst>
               </p:cTn>
               <p:prevCondLst>
@@ -35915,6 +36116,9 @@
         </p:cTn>
       </p:par>
     </p:tnLst>
+    <p:bldLst>
+      <p:bldP spid="41" grpId="0"/>
+    </p:bldLst>
   </p:timing>
 </p:sld>
 </file>

</xml_diff>

<commit_message>
linked the Streamlit demo to the preso
</commit_message>
<xml_diff>
--- a/Project_3-Group_3.pptx
+++ b/Project_3-Group_3.pptx
@@ -205,7 +205,7 @@
           <a:p>
             <a:fld id="{ED90A388-8002-4142-8F1D-6DA6CC92C231}" type="datetimeFigureOut">
               <a:rPr lang="en-US" smtClean="0"/>
-              <a:t>11/25/23</a:t>
+              <a:t>11/27/23</a:t>
             </a:fld>
             <a:endParaRPr lang="en-US"/>
           </a:p>
@@ -619,7 +619,7 @@
           <a:p>
             <a:fld id="{06B42541-9D3D-724A-9E19-ECAF61B72A33}" type="datetimeFigureOut">
               <a:rPr lang="en-US" smtClean="0"/>
-              <a:t>11/25/23</a:t>
+              <a:t>11/27/23</a:t>
             </a:fld>
             <a:endParaRPr lang="en-US"/>
           </a:p>
@@ -817,7 +817,7 @@
           <a:p>
             <a:fld id="{06B42541-9D3D-724A-9E19-ECAF61B72A33}" type="datetimeFigureOut">
               <a:rPr lang="en-US" smtClean="0"/>
-              <a:t>11/25/23</a:t>
+              <a:t>11/27/23</a:t>
             </a:fld>
             <a:endParaRPr lang="en-US"/>
           </a:p>
@@ -1025,7 +1025,7 @@
           <a:p>
             <a:fld id="{06B42541-9D3D-724A-9E19-ECAF61B72A33}" type="datetimeFigureOut">
               <a:rPr lang="en-US" smtClean="0"/>
-              <a:t>11/25/23</a:t>
+              <a:t>11/27/23</a:t>
             </a:fld>
             <a:endParaRPr lang="en-US"/>
           </a:p>
@@ -3205,7 +3205,7 @@
             <a:fld id="{FD1176A7-B091-469C-82C8-89C693043C40}" type="datetimeFigureOut">
               <a:rPr lang="en-US" smtClean="0"/>
               <a:pPr/>
-              <a:t>11/25/23</a:t>
+              <a:t>11/27/23</a:t>
             </a:fld>
             <a:endParaRPr lang="en-US"/>
           </a:p>
@@ -3408,7 +3408,7 @@
           <a:p>
             <a:fld id="{06B42541-9D3D-724A-9E19-ECAF61B72A33}" type="datetimeFigureOut">
               <a:rPr lang="en-US" smtClean="0"/>
-              <a:t>11/25/23</a:t>
+              <a:t>11/27/23</a:t>
             </a:fld>
             <a:endParaRPr lang="en-US"/>
           </a:p>
@@ -3876,7 +3876,7 @@
             <a:fld id="{FD1176A7-B091-469C-82C8-89C693043C40}" type="datetimeFigureOut">
               <a:rPr lang="en-US" smtClean="0"/>
               <a:pPr/>
-              <a:t>11/25/23</a:t>
+              <a:t>11/27/23</a:t>
             </a:fld>
             <a:endParaRPr lang="en-US"/>
           </a:p>
@@ -4239,7 +4239,7 @@
             <a:fld id="{FD1176A7-B091-469C-82C8-89C693043C40}" type="datetimeFigureOut">
               <a:rPr lang="en-US" smtClean="0"/>
               <a:pPr/>
-              <a:t>11/25/23</a:t>
+              <a:t>11/27/23</a:t>
             </a:fld>
             <a:endParaRPr lang="en-US"/>
           </a:p>
@@ -4557,7 +4557,7 @@
             <a:fld id="{FD1176A7-B091-469C-82C8-89C693043C40}" type="datetimeFigureOut">
               <a:rPr lang="en-US" smtClean="0"/>
               <a:pPr/>
-              <a:t>11/25/23</a:t>
+              <a:t>11/27/23</a:t>
             </a:fld>
             <a:endParaRPr lang="en-US"/>
           </a:p>
@@ -4852,7 +4852,7 @@
             <a:fld id="{FD1176A7-B091-469C-82C8-89C693043C40}" type="datetimeFigureOut">
               <a:rPr lang="en-US" smtClean="0"/>
               <a:pPr/>
-              <a:t>11/25/23</a:t>
+              <a:t>11/27/23</a:t>
             </a:fld>
             <a:endParaRPr lang="en-US"/>
           </a:p>
@@ -5070,7 +5070,7 @@
             <a:fld id="{FD1176A7-B091-469C-82C8-89C693043C40}" type="datetimeFigureOut">
               <a:rPr lang="en-US" smtClean="0"/>
               <a:pPr/>
-              <a:t>11/25/23</a:t>
+              <a:t>11/27/23</a:t>
             </a:fld>
             <a:endParaRPr lang="en-US"/>
           </a:p>
@@ -5288,7 +5288,7 @@
             <a:fld id="{FD1176A7-B091-469C-82C8-89C693043C40}" type="datetimeFigureOut">
               <a:rPr lang="en-US" smtClean="0"/>
               <a:pPr/>
-              <a:t>11/25/23</a:t>
+              <a:t>11/27/23</a:t>
             </a:fld>
             <a:endParaRPr lang="en-US"/>
           </a:p>
@@ -5417,7 +5417,7 @@
             <a:fld id="{FD1176A7-B091-469C-82C8-89C693043C40}" type="datetimeFigureOut">
               <a:rPr lang="en-US" smtClean="0"/>
               <a:pPr/>
-              <a:t>11/25/23</a:t>
+              <a:t>11/27/23</a:t>
             </a:fld>
             <a:endParaRPr lang="en-US"/>
           </a:p>
@@ -5546,7 +5546,7 @@
             <a:fld id="{FD1176A7-B091-469C-82C8-89C693043C40}" type="datetimeFigureOut">
               <a:rPr lang="en-US" smtClean="0"/>
               <a:pPr/>
-              <a:t>11/25/23</a:t>
+              <a:t>11/27/23</a:t>
             </a:fld>
             <a:endParaRPr lang="en-US"/>
           </a:p>
@@ -5914,7 +5914,7 @@
           <a:p>
             <a:fld id="{06B42541-9D3D-724A-9E19-ECAF61B72A33}" type="datetimeFigureOut">
               <a:rPr lang="en-US" smtClean="0"/>
-              <a:t>11/25/23</a:t>
+              <a:t>11/27/23</a:t>
             </a:fld>
             <a:endParaRPr lang="en-US"/>
           </a:p>
@@ -6052,7 +6052,7 @@
             <a:fld id="{FD1176A7-B091-469C-82C8-89C693043C40}" type="datetimeFigureOut">
               <a:rPr lang="en-US" smtClean="0"/>
               <a:pPr/>
-              <a:t>11/25/23</a:t>
+              <a:t>11/27/23</a:t>
             </a:fld>
             <a:endParaRPr lang="en-US" dirty="0"/>
           </a:p>
@@ -6208,7 +6208,7 @@
             <a:fld id="{425404F2-BE9A-4460-8815-8F645183555F}" type="datetimeFigureOut">
               <a:rPr lang="en-US" smtClean="0"/>
               <a:pPr/>
-              <a:t>11/25/23</a:t>
+              <a:t>11/27/23</a:t>
             </a:fld>
             <a:endParaRPr lang="en-US"/>
           </a:p>
@@ -6326,7 +6326,7 @@
           <a:p>
             <a:fld id="{3FF0B537-018C-4C76-B32D-FE835C3A8A73}" type="datetimeFigureOut">
               <a:rPr lang="en-US" smtClean="0"/>
-              <a:t>11/25/23</a:t>
+              <a:t>11/27/23</a:t>
             </a:fld>
             <a:endParaRPr lang="en-US"/>
           </a:p>
@@ -6591,7 +6591,7 @@
           <a:p>
             <a:fld id="{06B42541-9D3D-724A-9E19-ECAF61B72A33}" type="datetimeFigureOut">
               <a:rPr lang="en-US" smtClean="0"/>
-              <a:t>11/25/23</a:t>
+              <a:t>11/27/23</a:t>
             </a:fld>
             <a:endParaRPr lang="en-US"/>
           </a:p>
@@ -7003,7 +7003,7 @@
           <a:p>
             <a:fld id="{06B42541-9D3D-724A-9E19-ECAF61B72A33}" type="datetimeFigureOut">
               <a:rPr lang="en-US" smtClean="0"/>
-              <a:t>11/25/23</a:t>
+              <a:t>11/27/23</a:t>
             </a:fld>
             <a:endParaRPr lang="en-US"/>
           </a:p>
@@ -7144,7 +7144,7 @@
           <a:p>
             <a:fld id="{06B42541-9D3D-724A-9E19-ECAF61B72A33}" type="datetimeFigureOut">
               <a:rPr lang="en-US" smtClean="0"/>
-              <a:t>11/25/23</a:t>
+              <a:t>11/27/23</a:t>
             </a:fld>
             <a:endParaRPr lang="en-US"/>
           </a:p>
@@ -7257,7 +7257,7 @@
           <a:p>
             <a:fld id="{06B42541-9D3D-724A-9E19-ECAF61B72A33}" type="datetimeFigureOut">
               <a:rPr lang="en-US" smtClean="0"/>
-              <a:t>11/25/23</a:t>
+              <a:t>11/27/23</a:t>
             </a:fld>
             <a:endParaRPr lang="en-US"/>
           </a:p>
@@ -7568,7 +7568,7 @@
           <a:p>
             <a:fld id="{06B42541-9D3D-724A-9E19-ECAF61B72A33}" type="datetimeFigureOut">
               <a:rPr lang="en-US" smtClean="0"/>
-              <a:t>11/25/23</a:t>
+              <a:t>11/27/23</a:t>
             </a:fld>
             <a:endParaRPr lang="en-US"/>
           </a:p>
@@ -7856,7 +7856,7 @@
           <a:p>
             <a:fld id="{06B42541-9D3D-724A-9E19-ECAF61B72A33}" type="datetimeFigureOut">
               <a:rPr lang="en-US" smtClean="0"/>
-              <a:t>11/25/23</a:t>
+              <a:t>11/27/23</a:t>
             </a:fld>
             <a:endParaRPr lang="en-US"/>
           </a:p>
@@ -8097,7 +8097,7 @@
           <a:p>
             <a:fld id="{06B42541-9D3D-724A-9E19-ECAF61B72A33}" type="datetimeFigureOut">
               <a:rPr lang="en-US" smtClean="0"/>
-              <a:t>11/25/23</a:t>
+              <a:t>11/27/23</a:t>
             </a:fld>
             <a:endParaRPr lang="en-US"/>
           </a:p>
@@ -11512,7 +11512,7 @@
             </a:ln>
             <a:extLst>
               <a:ext uri="{C572A759-6A51-4108-AA02-DFA0A04FC94B}">
-                <ma14:wrappingTextBoxFlag xmlns:ma14="http://schemas.microsoft.com/office/mac/drawingml/2011/main" xmlns="" val="1"/>
+                <ma14:wrappingTextBoxFlag xmlns="" xmlns:ma14="http://schemas.microsoft.com/office/mac/drawingml/2011/main" val="1"/>
               </a:ext>
             </a:extLst>
           </p:spPr>
@@ -11823,7 +11823,7 @@
             </a:ln>
             <a:extLst>
               <a:ext uri="{C572A759-6A51-4108-AA02-DFA0A04FC94B}">
-                <ma14:wrappingTextBoxFlag xmlns:ma14="http://schemas.microsoft.com/office/mac/drawingml/2011/main" xmlns="" val="1"/>
+                <ma14:wrappingTextBoxFlag xmlns="" xmlns:ma14="http://schemas.microsoft.com/office/mac/drawingml/2011/main" val="1"/>
               </a:ext>
             </a:extLst>
           </p:spPr>
@@ -12133,7 +12133,7 @@
             </a:ln>
             <a:extLst>
               <a:ext uri="{C572A759-6A51-4108-AA02-DFA0A04FC94B}">
-                <ma14:wrappingTextBoxFlag xmlns:ma14="http://schemas.microsoft.com/office/mac/drawingml/2011/main" xmlns="" val="1"/>
+                <ma14:wrappingTextBoxFlag xmlns="" xmlns:ma14="http://schemas.microsoft.com/office/mac/drawingml/2011/main" val="1"/>
               </a:ext>
             </a:extLst>
           </p:spPr>
@@ -32354,11 +32354,11 @@
       </p:sp>
       <p:pic>
         <p:nvPicPr>
-          <p:cNvPr id="32" name="Demo.mov">
+          <p:cNvPr id="30" name="StreamlitDemoFinal.mov">
             <a:hlinkClick r:id="" action="ppaction://media"/>
             <a:extLst>
               <a:ext uri="{FF2B5EF4-FFF2-40B4-BE49-F238E27FC236}">
-                <a16:creationId xmlns:a16="http://schemas.microsoft.com/office/drawing/2014/main" id="{C6FB60BD-20AD-F3F1-A874-2F1EE9167921}"/>
+                <a16:creationId xmlns:a16="http://schemas.microsoft.com/office/drawing/2014/main" id="{95292963-C15E-C56C-098A-9170A4D751FF}"/>
               </a:ext>
             </a:extLst>
           </p:cNvPr>
@@ -32382,8 +32382,8 @@
         </p:blipFill>
         <p:spPr>
           <a:xfrm>
-            <a:off x="609600" y="0"/>
-            <a:ext cx="10972800" cy="6858000"/>
+            <a:off x="0" y="0"/>
+            <a:ext cx="12192000" cy="6858000"/>
           </a:xfrm>
           <a:prstGeom prst="rect">
             <a:avLst/>
@@ -32466,9 +32466,9 @@
                                   <p:childTnLst>
                                     <p:cmd type="call" cmd="playFrom(0.0)">
                                       <p:cBhvr>
-                                        <p:cTn id="10" dur="127366" fill="hold"/>
+                                        <p:cTn id="10" dur="118866" fill="hold"/>
                                         <p:tgtEl>
-                                          <p:spTgt spid="32"/>
+                                          <p:spTgt spid="30"/>
                                         </p:tgtEl>
                                       </p:cBhvr>
                                     </p:cmd>
@@ -32506,7 +32506,7 @@
                   </p:stCondLst>
                 </p:cTn>
                 <p:tgtEl>
-                  <p:spTgt spid="32"/>
+                  <p:spTgt spid="30"/>
                 </p:tgtEl>
               </p:cMediaNode>
             </p:video>
@@ -32515,7 +32515,7 @@
                 <p:stCondLst>
                   <p:cond evt="onClick" delay="0">
                     <p:tgtEl>
-                      <p:spTgt spid="32"/>
+                      <p:spTgt spid="30"/>
                     </p:tgtEl>
                   </p:cond>
                 </p:stCondLst>
@@ -32545,7 +32545,7 @@
                                       <p:cBhvr>
                                         <p:cTn id="16" dur="1" fill="hold"/>
                                         <p:tgtEl>
-                                          <p:spTgt spid="32"/>
+                                          <p:spTgt spid="30"/>
                                         </p:tgtEl>
                                       </p:cBhvr>
                                     </p:cmd>
@@ -32563,7 +32563,7 @@
               <p:nextCondLst>
                 <p:cond evt="onClick" delay="0">
                   <p:tgtEl>
-                    <p:spTgt spid="32"/>
+                    <p:spTgt spid="30"/>
                   </p:tgtEl>
                 </p:cond>
               </p:nextCondLst>
@@ -32940,7 +32940,7 @@
           <p:spPr>
             <a:xfrm>
               <a:off x="477674" y="4332555"/>
-              <a:ext cx="2062175" cy="1077218"/>
+              <a:ext cx="2062175" cy="1323439"/>
             </a:xfrm>
             <a:prstGeom prst="rect">
               <a:avLst/>
@@ -32965,7 +32965,7 @@
                   <a:ea typeface="Open Sans" panose="020B0606030504020204" pitchFamily="34" charset="0"/>
                   <a:cs typeface="Segoe UI" panose="020B0502040204020203" pitchFamily="34" charset="0"/>
                 </a:rPr>
-                <a:t>Determine how to properly link Ganache accounts and Solidity contracts via Web3.</a:t>
+                <a:t>Increase our knowledge of Solidity and Web3 to further modify the capabilities of the app.</a:t>
               </a:r>
             </a:p>
           </p:txBody>

</xml_diff>

<commit_message>
updated slide 4 in the preso, since we had the time to complete the StreamLit portion
</commit_message>
<xml_diff>
--- a/Project_3-Group_3.pptx
+++ b/Project_3-Group_3.pptx
@@ -205,7 +205,7 @@
           <a:p>
             <a:fld id="{ED90A388-8002-4142-8F1D-6DA6CC92C231}" type="datetimeFigureOut">
               <a:rPr lang="en-US" smtClean="0"/>
-              <a:t>11/27/23</a:t>
+              <a:t>11/29/23</a:t>
             </a:fld>
             <a:endParaRPr lang="en-US"/>
           </a:p>
@@ -619,7 +619,7 @@
           <a:p>
             <a:fld id="{06B42541-9D3D-724A-9E19-ECAF61B72A33}" type="datetimeFigureOut">
               <a:rPr lang="en-US" smtClean="0"/>
-              <a:t>11/27/23</a:t>
+              <a:t>11/29/23</a:t>
             </a:fld>
             <a:endParaRPr lang="en-US"/>
           </a:p>
@@ -817,7 +817,7 @@
           <a:p>
             <a:fld id="{06B42541-9D3D-724A-9E19-ECAF61B72A33}" type="datetimeFigureOut">
               <a:rPr lang="en-US" smtClean="0"/>
-              <a:t>11/27/23</a:t>
+              <a:t>11/29/23</a:t>
             </a:fld>
             <a:endParaRPr lang="en-US"/>
           </a:p>
@@ -1025,7 +1025,7 @@
           <a:p>
             <a:fld id="{06B42541-9D3D-724A-9E19-ECAF61B72A33}" type="datetimeFigureOut">
               <a:rPr lang="en-US" smtClean="0"/>
-              <a:t>11/27/23</a:t>
+              <a:t>11/29/23</a:t>
             </a:fld>
             <a:endParaRPr lang="en-US"/>
           </a:p>
@@ -3205,7 +3205,7 @@
             <a:fld id="{FD1176A7-B091-469C-82C8-89C693043C40}" type="datetimeFigureOut">
               <a:rPr lang="en-US" smtClean="0"/>
               <a:pPr/>
-              <a:t>11/27/23</a:t>
+              <a:t>11/29/23</a:t>
             </a:fld>
             <a:endParaRPr lang="en-US"/>
           </a:p>
@@ -3408,7 +3408,7 @@
           <a:p>
             <a:fld id="{06B42541-9D3D-724A-9E19-ECAF61B72A33}" type="datetimeFigureOut">
               <a:rPr lang="en-US" smtClean="0"/>
-              <a:t>11/27/23</a:t>
+              <a:t>11/29/23</a:t>
             </a:fld>
             <a:endParaRPr lang="en-US"/>
           </a:p>
@@ -3876,7 +3876,7 @@
             <a:fld id="{FD1176A7-B091-469C-82C8-89C693043C40}" type="datetimeFigureOut">
               <a:rPr lang="en-US" smtClean="0"/>
               <a:pPr/>
-              <a:t>11/27/23</a:t>
+              <a:t>11/29/23</a:t>
             </a:fld>
             <a:endParaRPr lang="en-US"/>
           </a:p>
@@ -4239,7 +4239,7 @@
             <a:fld id="{FD1176A7-B091-469C-82C8-89C693043C40}" type="datetimeFigureOut">
               <a:rPr lang="en-US" smtClean="0"/>
               <a:pPr/>
-              <a:t>11/27/23</a:t>
+              <a:t>11/29/23</a:t>
             </a:fld>
             <a:endParaRPr lang="en-US"/>
           </a:p>
@@ -4557,7 +4557,7 @@
             <a:fld id="{FD1176A7-B091-469C-82C8-89C693043C40}" type="datetimeFigureOut">
               <a:rPr lang="en-US" smtClean="0"/>
               <a:pPr/>
-              <a:t>11/27/23</a:t>
+              <a:t>11/29/23</a:t>
             </a:fld>
             <a:endParaRPr lang="en-US"/>
           </a:p>
@@ -4852,7 +4852,7 @@
             <a:fld id="{FD1176A7-B091-469C-82C8-89C693043C40}" type="datetimeFigureOut">
               <a:rPr lang="en-US" smtClean="0"/>
               <a:pPr/>
-              <a:t>11/27/23</a:t>
+              <a:t>11/29/23</a:t>
             </a:fld>
             <a:endParaRPr lang="en-US"/>
           </a:p>
@@ -5070,7 +5070,7 @@
             <a:fld id="{FD1176A7-B091-469C-82C8-89C693043C40}" type="datetimeFigureOut">
               <a:rPr lang="en-US" smtClean="0"/>
               <a:pPr/>
-              <a:t>11/27/23</a:t>
+              <a:t>11/29/23</a:t>
             </a:fld>
             <a:endParaRPr lang="en-US"/>
           </a:p>
@@ -5288,7 +5288,7 @@
             <a:fld id="{FD1176A7-B091-469C-82C8-89C693043C40}" type="datetimeFigureOut">
               <a:rPr lang="en-US" smtClean="0"/>
               <a:pPr/>
-              <a:t>11/27/23</a:t>
+              <a:t>11/29/23</a:t>
             </a:fld>
             <a:endParaRPr lang="en-US"/>
           </a:p>
@@ -5417,7 +5417,7 @@
             <a:fld id="{FD1176A7-B091-469C-82C8-89C693043C40}" type="datetimeFigureOut">
               <a:rPr lang="en-US" smtClean="0"/>
               <a:pPr/>
-              <a:t>11/27/23</a:t>
+              <a:t>11/29/23</a:t>
             </a:fld>
             <a:endParaRPr lang="en-US"/>
           </a:p>
@@ -5546,7 +5546,7 @@
             <a:fld id="{FD1176A7-B091-469C-82C8-89C693043C40}" type="datetimeFigureOut">
               <a:rPr lang="en-US" smtClean="0"/>
               <a:pPr/>
-              <a:t>11/27/23</a:t>
+              <a:t>11/29/23</a:t>
             </a:fld>
             <a:endParaRPr lang="en-US"/>
           </a:p>
@@ -5914,7 +5914,7 @@
           <a:p>
             <a:fld id="{06B42541-9D3D-724A-9E19-ECAF61B72A33}" type="datetimeFigureOut">
               <a:rPr lang="en-US" smtClean="0"/>
-              <a:t>11/27/23</a:t>
+              <a:t>11/29/23</a:t>
             </a:fld>
             <a:endParaRPr lang="en-US"/>
           </a:p>
@@ -6052,7 +6052,7 @@
             <a:fld id="{FD1176A7-B091-469C-82C8-89C693043C40}" type="datetimeFigureOut">
               <a:rPr lang="en-US" smtClean="0"/>
               <a:pPr/>
-              <a:t>11/27/23</a:t>
+              <a:t>11/29/23</a:t>
             </a:fld>
             <a:endParaRPr lang="en-US" dirty="0"/>
           </a:p>
@@ -6208,7 +6208,7 @@
             <a:fld id="{425404F2-BE9A-4460-8815-8F645183555F}" type="datetimeFigureOut">
               <a:rPr lang="en-US" smtClean="0"/>
               <a:pPr/>
-              <a:t>11/27/23</a:t>
+              <a:t>11/29/23</a:t>
             </a:fld>
             <a:endParaRPr lang="en-US"/>
           </a:p>
@@ -6326,7 +6326,7 @@
           <a:p>
             <a:fld id="{3FF0B537-018C-4C76-B32D-FE835C3A8A73}" type="datetimeFigureOut">
               <a:rPr lang="en-US" smtClean="0"/>
-              <a:t>11/27/23</a:t>
+              <a:t>11/29/23</a:t>
             </a:fld>
             <a:endParaRPr lang="en-US"/>
           </a:p>
@@ -6591,7 +6591,7 @@
           <a:p>
             <a:fld id="{06B42541-9D3D-724A-9E19-ECAF61B72A33}" type="datetimeFigureOut">
               <a:rPr lang="en-US" smtClean="0"/>
-              <a:t>11/27/23</a:t>
+              <a:t>11/29/23</a:t>
             </a:fld>
             <a:endParaRPr lang="en-US"/>
           </a:p>
@@ -7003,7 +7003,7 @@
           <a:p>
             <a:fld id="{06B42541-9D3D-724A-9E19-ECAF61B72A33}" type="datetimeFigureOut">
               <a:rPr lang="en-US" smtClean="0"/>
-              <a:t>11/27/23</a:t>
+              <a:t>11/29/23</a:t>
             </a:fld>
             <a:endParaRPr lang="en-US"/>
           </a:p>
@@ -7144,7 +7144,7 @@
           <a:p>
             <a:fld id="{06B42541-9D3D-724A-9E19-ECAF61B72A33}" type="datetimeFigureOut">
               <a:rPr lang="en-US" smtClean="0"/>
-              <a:t>11/27/23</a:t>
+              <a:t>11/29/23</a:t>
             </a:fld>
             <a:endParaRPr lang="en-US"/>
           </a:p>
@@ -7257,7 +7257,7 @@
           <a:p>
             <a:fld id="{06B42541-9D3D-724A-9E19-ECAF61B72A33}" type="datetimeFigureOut">
               <a:rPr lang="en-US" smtClean="0"/>
-              <a:t>11/27/23</a:t>
+              <a:t>11/29/23</a:t>
             </a:fld>
             <a:endParaRPr lang="en-US"/>
           </a:p>
@@ -7568,7 +7568,7 @@
           <a:p>
             <a:fld id="{06B42541-9D3D-724A-9E19-ECAF61B72A33}" type="datetimeFigureOut">
               <a:rPr lang="en-US" smtClean="0"/>
-              <a:t>11/27/23</a:t>
+              <a:t>11/29/23</a:t>
             </a:fld>
             <a:endParaRPr lang="en-US"/>
           </a:p>
@@ -7856,7 +7856,7 @@
           <a:p>
             <a:fld id="{06B42541-9D3D-724A-9E19-ECAF61B72A33}" type="datetimeFigureOut">
               <a:rPr lang="en-US" smtClean="0"/>
-              <a:t>11/27/23</a:t>
+              <a:t>11/29/23</a:t>
             </a:fld>
             <a:endParaRPr lang="en-US"/>
           </a:p>
@@ -8097,7 +8097,7 @@
           <a:p>
             <a:fld id="{06B42541-9D3D-724A-9E19-ECAF61B72A33}" type="datetimeFigureOut">
               <a:rPr lang="en-US" smtClean="0"/>
-              <a:t>11/27/23</a:t>
+              <a:t>11/29/23</a:t>
             </a:fld>
             <a:endParaRPr lang="en-US"/>
           </a:p>
@@ -11512,7 +11512,7 @@
             </a:ln>
             <a:extLst>
               <a:ext uri="{C572A759-6A51-4108-AA02-DFA0A04FC94B}">
-                <ma14:wrappingTextBoxFlag xmlns="" xmlns:ma14="http://schemas.microsoft.com/office/mac/drawingml/2011/main" val="1"/>
+                <ma14:wrappingTextBoxFlag xmlns:ma14="http://schemas.microsoft.com/office/mac/drawingml/2011/main" xmlns="" val="1"/>
               </a:ext>
             </a:extLst>
           </p:spPr>
@@ -11823,7 +11823,7 @@
             </a:ln>
             <a:extLst>
               <a:ext uri="{C572A759-6A51-4108-AA02-DFA0A04FC94B}">
-                <ma14:wrappingTextBoxFlag xmlns="" xmlns:ma14="http://schemas.microsoft.com/office/mac/drawingml/2011/main" val="1"/>
+                <ma14:wrappingTextBoxFlag xmlns:ma14="http://schemas.microsoft.com/office/mac/drawingml/2011/main" xmlns="" val="1"/>
               </a:ext>
             </a:extLst>
           </p:spPr>
@@ -12133,7 +12133,7 @@
             </a:ln>
             <a:extLst>
               <a:ext uri="{C572A759-6A51-4108-AA02-DFA0A04FC94B}">
-                <ma14:wrappingTextBoxFlag xmlns="" xmlns:ma14="http://schemas.microsoft.com/office/mac/drawingml/2011/main" val="1"/>
+                <ma14:wrappingTextBoxFlag xmlns:ma14="http://schemas.microsoft.com/office/mac/drawingml/2011/main" xmlns="" val="1"/>
               </a:ext>
             </a:extLst>
           </p:spPr>
@@ -16590,7 +16590,7 @@
                   <a:latin typeface="Arial" panose="020B0604020202020204" pitchFamily="34" charset="0"/>
                   <a:cs typeface="Arial" panose="020B0604020202020204" pitchFamily="34" charset="0"/>
                 </a:rPr>
-                <a:t>Time-permitting, create a visual interface to interact with the platform on a web interface.</a:t>
+                <a:t>Create a visual interface to interact with the platform on a web interface.</a:t>
               </a:r>
             </a:p>
           </p:txBody>

</xml_diff>